<commit_message>
small fix on slides
</commit_message>
<xml_diff>
--- a/day1.pptx
+++ b/day1.pptx
@@ -6298,7 +6298,7 @@
           <a:p>
             <a:fld id="{16E5F246-0B7D-44DF-8C1B-EDFCA5DA626A}" type="datetimeFigureOut">
               <a:rPr lang="ru-RU" smtClean="0"/>
-              <a:t>19.08.2015</a:t>
+              <a:t>20.08.2015</a:t>
             </a:fld>
             <a:endParaRPr lang="ru-RU"/>
           </a:p>
@@ -7671,7 +7671,7 @@
           <a:p>
             <a:fld id="{ED7A5A9E-355E-4F5A-82F5-195339D13266}" type="datetimeFigureOut">
               <a:rPr lang="ru-RU" smtClean="0"/>
-              <a:t>19.08.2015</a:t>
+              <a:t>20.08.2015</a:t>
             </a:fld>
             <a:endParaRPr lang="ru-RU"/>
           </a:p>
@@ -7841,7 +7841,7 @@
           <a:p>
             <a:fld id="{ED7A5A9E-355E-4F5A-82F5-195339D13266}" type="datetimeFigureOut">
               <a:rPr lang="ru-RU" smtClean="0"/>
-              <a:t>19.08.2015</a:t>
+              <a:t>20.08.2015</a:t>
             </a:fld>
             <a:endParaRPr lang="ru-RU"/>
           </a:p>
@@ -8021,7 +8021,7 @@
           <a:p>
             <a:fld id="{ED7A5A9E-355E-4F5A-82F5-195339D13266}" type="datetimeFigureOut">
               <a:rPr lang="ru-RU" smtClean="0"/>
-              <a:t>19.08.2015</a:t>
+              <a:t>20.08.2015</a:t>
             </a:fld>
             <a:endParaRPr lang="ru-RU"/>
           </a:p>
@@ -8191,7 +8191,7 @@
           <a:p>
             <a:fld id="{ED7A5A9E-355E-4F5A-82F5-195339D13266}" type="datetimeFigureOut">
               <a:rPr lang="ru-RU" smtClean="0"/>
-              <a:t>19.08.2015</a:t>
+              <a:t>20.08.2015</a:t>
             </a:fld>
             <a:endParaRPr lang="ru-RU"/>
           </a:p>
@@ -8437,7 +8437,7 @@
           <a:p>
             <a:fld id="{ED7A5A9E-355E-4F5A-82F5-195339D13266}" type="datetimeFigureOut">
               <a:rPr lang="ru-RU" smtClean="0"/>
-              <a:t>19.08.2015</a:t>
+              <a:t>20.08.2015</a:t>
             </a:fld>
             <a:endParaRPr lang="ru-RU"/>
           </a:p>
@@ -8725,7 +8725,7 @@
           <a:p>
             <a:fld id="{ED7A5A9E-355E-4F5A-82F5-195339D13266}" type="datetimeFigureOut">
               <a:rPr lang="ru-RU" smtClean="0"/>
-              <a:t>19.08.2015</a:t>
+              <a:t>20.08.2015</a:t>
             </a:fld>
             <a:endParaRPr lang="ru-RU"/>
           </a:p>
@@ -9147,7 +9147,7 @@
           <a:p>
             <a:fld id="{ED7A5A9E-355E-4F5A-82F5-195339D13266}" type="datetimeFigureOut">
               <a:rPr lang="ru-RU" smtClean="0"/>
-              <a:t>19.08.2015</a:t>
+              <a:t>20.08.2015</a:t>
             </a:fld>
             <a:endParaRPr lang="ru-RU"/>
           </a:p>
@@ -9265,7 +9265,7 @@
           <a:p>
             <a:fld id="{ED7A5A9E-355E-4F5A-82F5-195339D13266}" type="datetimeFigureOut">
               <a:rPr lang="ru-RU" smtClean="0"/>
-              <a:t>19.08.2015</a:t>
+              <a:t>20.08.2015</a:t>
             </a:fld>
             <a:endParaRPr lang="ru-RU"/>
           </a:p>
@@ -9360,7 +9360,7 @@
           <a:p>
             <a:fld id="{ED7A5A9E-355E-4F5A-82F5-195339D13266}" type="datetimeFigureOut">
               <a:rPr lang="ru-RU" smtClean="0"/>
-              <a:t>19.08.2015</a:t>
+              <a:t>20.08.2015</a:t>
             </a:fld>
             <a:endParaRPr lang="ru-RU"/>
           </a:p>
@@ -9637,7 +9637,7 @@
           <a:p>
             <a:fld id="{ED7A5A9E-355E-4F5A-82F5-195339D13266}" type="datetimeFigureOut">
               <a:rPr lang="ru-RU" smtClean="0"/>
-              <a:t>19.08.2015</a:t>
+              <a:t>20.08.2015</a:t>
             </a:fld>
             <a:endParaRPr lang="ru-RU"/>
           </a:p>
@@ -9890,7 +9890,7 @@
           <a:p>
             <a:fld id="{ED7A5A9E-355E-4F5A-82F5-195339D13266}" type="datetimeFigureOut">
               <a:rPr lang="ru-RU" smtClean="0"/>
-              <a:t>19.08.2015</a:t>
+              <a:t>20.08.2015</a:t>
             </a:fld>
             <a:endParaRPr lang="ru-RU"/>
           </a:p>
@@ -10103,7 +10103,7 @@
           <a:p>
             <a:fld id="{ED7A5A9E-355E-4F5A-82F5-195339D13266}" type="datetimeFigureOut">
               <a:rPr lang="ru-RU" smtClean="0"/>
-              <a:t>19.08.2015</a:t>
+              <a:t>20.08.2015</a:t>
             </a:fld>
             <a:endParaRPr lang="ru-RU"/>
           </a:p>
@@ -17376,7 +17376,7 @@
           <a:graphicData uri="http://schemas.openxmlformats.org/presentationml/2006/ole">
             <mc:AlternateContent xmlns:mc="http://schemas.openxmlformats.org/markup-compatibility/2006">
               <mc:Choice xmlns:v="urn:schemas-microsoft-com:vml" Requires="v">
-                <p:oleObj spid="_x0000_s1053" name="VISIO" r:id="rId4" imgW="2544803" imgH="251238" progId="Visio.Drawing.5">
+                <p:oleObj spid="_x0000_s1056" name="VISIO" r:id="rId4" imgW="2544803" imgH="251238" progId="Visio.Drawing.5">
                   <p:embed/>
                 </p:oleObj>
               </mc:Choice>
@@ -18167,7 +18167,9 @@
         </p:nvSpPr>
         <p:spPr/>
         <p:txBody>
-          <a:bodyPr/>
+          <a:bodyPr>
+            <a:normAutofit lnSpcReduction="10000"/>
+          </a:bodyPr>
           <a:lstStyle/>
           <a:p>
             <a:pPr marL="0" indent="0">
@@ -18233,8 +18235,31 @@
             </a:r>
             <a:r>
               <a:rPr lang="en-US" dirty="0" smtClean="0"/>
-              <a:t> — Test</a:t>
-            </a:r>
+              <a:t> — </a:t>
+            </a:r>
+            <a:r>
+              <a:rPr lang="en-US" dirty="0" smtClean="0"/>
+              <a:t>Test</a:t>
+            </a:r>
+            <a:endParaRPr lang="ru-RU" dirty="0" smtClean="0"/>
+          </a:p>
+          <a:p>
+            <a:pPr marL="0" indent="0">
+              <a:buNone/>
+            </a:pPr>
+            <a:r>
+              <a:rPr lang="en-US" dirty="0" err="1" smtClean="0"/>
+              <a:t>su</a:t>
+            </a:r>
+            <a:r>
+              <a:rPr lang="en-US" dirty="0" smtClean="0"/>
+              <a:t> — </a:t>
+            </a:r>
+            <a:r>
+              <a:rPr lang="en-US" dirty="0" err="1" smtClean="0"/>
+              <a:t>SetUp</a:t>
+            </a:r>
+            <a:endParaRPr lang="en-US" dirty="0" smtClean="0"/>
           </a:p>
           <a:p>
             <a:pPr marL="0" indent="0">
@@ -18358,19 +18383,61 @@
           <a:lstStyle/>
           <a:p>
             <a:r>
+              <a:rPr lang="en-US" dirty="0" err="1" smtClean="0"/>
+              <a:t>Ctrl+T+L</a:t>
+            </a:r>
+            <a:r>
+              <a:rPr lang="en-US" dirty="0" smtClean="0"/>
+              <a:t> — </a:t>
+            </a:r>
+            <a:r>
+              <a:rPr lang="ru-RU" dirty="0" smtClean="0"/>
+              <a:t>все тесты в </a:t>
+            </a:r>
+            <a:r>
+              <a:rPr lang="ru-RU" dirty="0" err="1" smtClean="0"/>
+              <a:t>солюшене</a:t>
+            </a:r>
+            <a:r>
+              <a:rPr lang="ru-RU" dirty="0" smtClean="0"/>
+              <a:t>, </a:t>
+            </a:r>
+          </a:p>
+          <a:p>
+            <a:r>
+              <a:rPr lang="en-US" dirty="0" err="1" smtClean="0"/>
+              <a:t>Ctrl+T+R</a:t>
+            </a:r>
+            <a:r>
+              <a:rPr lang="ru-RU" dirty="0" smtClean="0"/>
+              <a:t>, </a:t>
+            </a:r>
+            <a:r>
+              <a:rPr lang="en-US" dirty="0" err="1" smtClean="0"/>
+              <a:t>Ctrl+T+T</a:t>
+            </a:r>
+            <a:endParaRPr lang="ru-RU" dirty="0"/>
+          </a:p>
+          <a:p>
+            <a:r>
               <a:rPr lang="en-US" dirty="0" smtClean="0"/>
               <a:t>TeamCity</a:t>
             </a:r>
+            <a:endParaRPr lang="ru-RU" dirty="0" smtClean="0"/>
           </a:p>
           <a:p>
             <a:r>
               <a:rPr lang="en-US" dirty="0" smtClean="0"/>
-              <a:t>Run after build:</a:t>
-            </a:r>
-          </a:p>
-          <a:p>
-            <a:pPr marL="971550" lvl="1" indent="-514350">
-              <a:buAutoNum type="arabicPeriod"/>
+              <a:t>Run </a:t>
+            </a:r>
+            <a:r>
+              <a:rPr lang="en-US" dirty="0" smtClean="0"/>
+              <a:t>after build:</a:t>
+            </a:r>
+          </a:p>
+          <a:p>
+            <a:pPr marL="457200" lvl="1" indent="0">
+              <a:buNone/>
             </a:pPr>
             <a:r>
               <a:rPr lang="en-US" sz="2400" dirty="0" smtClean="0">
@@ -18474,43 +18541,10 @@
               </a:rPr>
               <a:t>nodots</a:t>
             </a:r>
-            <a:endParaRPr lang="en-US" sz="2400" dirty="0" smtClean="0">
+            <a:endParaRPr lang="ru-RU" sz="2400" dirty="0" smtClean="0">
               <a:latin typeface="Consolas" panose="020B0609020204030204" pitchFamily="49" charset="0"/>
               <a:cs typeface="Consolas" panose="020B0609020204030204" pitchFamily="49" charset="0"/>
             </a:endParaRPr>
-          </a:p>
-          <a:p>
-            <a:pPr marL="971550" lvl="1" indent="-514350">
-              <a:buAutoNum type="arabicPeriod"/>
-            </a:pPr>
-            <a:r>
-              <a:rPr lang="en-US" dirty="0" smtClean="0"/>
-              <a:t>TEST → Test Settings → Run Tests After Build</a:t>
-            </a:r>
-            <a:r>
-              <a:rPr lang="ru-RU" dirty="0" smtClean="0"/>
-              <a:t/>
-            </a:r>
-            <a:br>
-              <a:rPr lang="ru-RU" dirty="0" smtClean="0"/>
-            </a:br>
-            <a:r>
-              <a:rPr lang="ru-RU" dirty="0" smtClean="0"/>
-              <a:t>(+</a:t>
-            </a:r>
-            <a:r>
-              <a:rPr lang="en-US" dirty="0" smtClean="0"/>
-              <a:t> </a:t>
-            </a:r>
-            <a:r>
-              <a:rPr lang="en-US" dirty="0" err="1" smtClean="0"/>
-              <a:t>NUnit</a:t>
-            </a:r>
-            <a:r>
-              <a:rPr lang="en-US" dirty="0" smtClean="0"/>
-              <a:t> Test adapter)</a:t>
-            </a:r>
-            <a:endParaRPr lang="ru-RU" dirty="0" smtClean="0"/>
           </a:p>
         </p:txBody>
       </p:sp>
@@ -18708,6 +18742,55 @@
                                           <p:spTgt spid="3">
                                             <p:txEl>
                                               <p:pRg st="3" end="3"/>
+                                            </p:txEl>
+                                          </p:spTgt>
+                                        </p:tgtEl>
+                                        <p:attrNameLst>
+                                          <p:attrName>style.visibility</p:attrName>
+                                        </p:attrNameLst>
+                                      </p:cBhvr>
+                                      <p:to>
+                                        <p:strVal val="visible"/>
+                                      </p:to>
+                                    </p:set>
+                                  </p:childTnLst>
+                                </p:cTn>
+                              </p:par>
+                            </p:childTnLst>
+                          </p:cTn>
+                        </p:par>
+                      </p:childTnLst>
+                    </p:cTn>
+                  </p:par>
+                  <p:par>
+                    <p:cTn id="19" fill="hold">
+                      <p:stCondLst>
+                        <p:cond delay="indefinite"/>
+                      </p:stCondLst>
+                      <p:childTnLst>
+                        <p:par>
+                          <p:cTn id="20" fill="hold">
+                            <p:stCondLst>
+                              <p:cond delay="0"/>
+                            </p:stCondLst>
+                            <p:childTnLst>
+                              <p:par>
+                                <p:cTn id="21" presetID="1" presetClass="entr" presetSubtype="0" fill="hold" grpId="0" nodeType="clickEffect">
+                                  <p:stCondLst>
+                                    <p:cond delay="0"/>
+                                  </p:stCondLst>
+                                  <p:childTnLst>
+                                    <p:set>
+                                      <p:cBhvr>
+                                        <p:cTn id="22" dur="1" fill="hold">
+                                          <p:stCondLst>
+                                            <p:cond delay="0"/>
+                                          </p:stCondLst>
+                                        </p:cTn>
+                                        <p:tgtEl>
+                                          <p:spTgt spid="3">
+                                            <p:txEl>
+                                              <p:pRg st="4" end="4"/>
                                             </p:txEl>
                                           </p:spTgt>
                                         </p:tgtEl>

</xml_diff>